<commit_message>
edit of the presentation
</commit_message>
<xml_diff>
--- a/2_DesignDocument/presentation/SE2_DD_slides.pptx
+++ b/2_DesignDocument/presentation/SE2_DD_slides.pptx
@@ -7,12 +7,16 @@
   <p:sldIdLst>
     <p:sldId id="256" r:id="rId2"/>
     <p:sldId id="257" r:id="rId3"/>
-    <p:sldId id="258" r:id="rId4"/>
-    <p:sldId id="259" r:id="rId5"/>
-    <p:sldId id="260" r:id="rId6"/>
-    <p:sldId id="261" r:id="rId7"/>
-    <p:sldId id="262" r:id="rId8"/>
-    <p:sldId id="263" r:id="rId9"/>
+    <p:sldId id="264" r:id="rId4"/>
+    <p:sldId id="258" r:id="rId5"/>
+    <p:sldId id="259" r:id="rId6"/>
+    <p:sldId id="260" r:id="rId7"/>
+    <p:sldId id="261" r:id="rId8"/>
+    <p:sldId id="262" r:id="rId9"/>
+    <p:sldId id="267" r:id="rId10"/>
+    <p:sldId id="265" r:id="rId11"/>
+    <p:sldId id="266" r:id="rId12"/>
+    <p:sldId id="263" r:id="rId13"/>
   </p:sldIdLst>
   <p:sldSz cx="9144000" cy="6858000" type="screen4x3"/>
   <p:notesSz cx="6858000" cy="9144000"/>
@@ -111,6 +115,11 @@
       </a:defRPr>
     </a:lvl9pPr>
   </p:defaultTextStyle>
+  <p:extLst>
+    <p:ext uri="{EFAFB233-063F-42B5-8137-9DF3F51BA10A}">
+      <p15:sldGuideLst xmlns:p15="http://schemas.microsoft.com/office/powerpoint/2012/main"/>
+    </p:ext>
+  </p:extLst>
 </p:presentation>
 </file>
 
@@ -123,14 +132,74 @@
       </p:ext>
     </p:extLst>
   </p:cmAuthor>
+  <p:cmAuthor id="2" name="Sergio Caprara" initials="SC" lastIdx="3" clrIdx="1">
+    <p:extLst>
+      <p:ext uri="{19B8F6BF-5375-455C-9EA6-DF929625EA0E}">
+        <p15:presenceInfo xmlns:p15="http://schemas.microsoft.com/office/powerpoint/2012/main" userId="572e62b76cc247f0" providerId="Windows Live"/>
+      </p:ext>
+    </p:extLst>
+  </p:cmAuthor>
 </p:cmAuthorLst>
 </file>
 
 <file path=ppt/comments/comment1.xml><?xml version="1.0" encoding="utf-8"?>
 <p:cmLst xmlns:a="http://schemas.openxmlformats.org/drawingml/2006/main" xmlns:r="http://schemas.openxmlformats.org/officeDocument/2006/relationships" xmlns:p="http://schemas.openxmlformats.org/presentationml/2006/main">
+  <p:cm authorId="2" dt="2016-12-13T10:15:37.871" idx="1">
+    <p:pos x="10" y="10"/>
+    <p:text>i would remove this one alone and merge it on the same slide of central application. We have not much to say about persistence, do we?</p:text>
+    <p:extLst>
+      <p:ext uri="{C676402C-5697-4E1C-873F-D02D1690AC5C}">
+        <p15:threadingInfo xmlns:p15="http://schemas.microsoft.com/office/powerpoint/2012/main" timeZoneBias="-60"/>
+      </p:ext>
+    </p:extLst>
+  </p:cm>
+</p:cmLst>
+</file>
+
+<file path=ppt/comments/comment2.xml><?xml version="1.0" encoding="utf-8"?>
+<p:cmLst xmlns:a="http://schemas.openxmlformats.org/drawingml/2006/main" xmlns:r="http://schemas.openxmlformats.org/officeDocument/2006/relationships" xmlns:p="http://schemas.openxmlformats.org/presentationml/2006/main">
   <p:cm authorId="1" dt="2016-12-13T00:21:40.649" idx="1">
     <p:pos x="788" y="451"/>
     <p:text>maybe it's better to show something about users and not operator. Maybe about operator we can put the check car status</p:text>
+    <p:extLst>
+      <p:ext uri="{C676402C-5697-4E1C-873F-D02D1690AC5C}">
+        <p15:threadingInfo xmlns:p15="http://schemas.microsoft.com/office/powerpoint/2012/main" timeZoneBias="-60"/>
+      </p:ext>
+    </p:extLst>
+  </p:cm>
+  <p:cm authorId="2" dt="2016-12-14T00:27:33.874" idx="2">
+    <p:pos x="788" y="587"/>
+    <p:text>yes maybe we could use the one of the user instead</p:text>
+    <p:extLst>
+      <p:ext uri="{C676402C-5697-4E1C-873F-D02D1690AC5C}">
+        <p15:threadingInfo xmlns:p15="http://schemas.microsoft.com/office/powerpoint/2012/main" timeZoneBias="-60">
+          <p15:parentCm authorId="1" idx="1"/>
+        </p15:threadingInfo>
+      </p:ext>
+    </p:extLst>
+  </p:cm>
+</p:cmLst>
+</file>
+
+<file path=ppt/comments/comment3.xml><?xml version="1.0" encoding="utf-8"?>
+<p:cmLst xmlns:a="http://schemas.openxmlformats.org/drawingml/2006/main" xmlns:r="http://schemas.openxmlformats.org/officeDocument/2006/relationships" xmlns:p="http://schemas.openxmlformats.org/presentationml/2006/main">
+  <p:cm authorId="2" dt="2016-12-14T00:43:04.067" idx="3">
+    <p:pos x="10" y="10"/>
+    <p:text>is this useful?</p:text>
+    <p:extLst>
+      <p:ext uri="{C676402C-5697-4E1C-873F-D02D1690AC5C}">
+        <p15:threadingInfo xmlns:p15="http://schemas.microsoft.com/office/powerpoint/2012/main" timeZoneBias="-60"/>
+      </p:ext>
+    </p:extLst>
+  </p:cm>
+</p:cmLst>
+</file>
+
+<file path=ppt/comments/comment4.xml><?xml version="1.0" encoding="utf-8"?>
+<p:cmLst xmlns:a="http://schemas.openxmlformats.org/drawingml/2006/main" xmlns:r="http://schemas.openxmlformats.org/officeDocument/2006/relationships" xmlns:p="http://schemas.openxmlformats.org/presentationml/2006/main">
+  <p:cm authorId="2" dt="2016-12-14T00:43:04.067" idx="3">
+    <p:pos x="10" y="10"/>
+    <p:text>is this useful?</p:text>
     <p:extLst>
       <p:ext uri="{C676402C-5697-4E1C-873F-D02D1690AC5C}">
         <p15:threadingInfo xmlns:p15="http://schemas.microsoft.com/office/powerpoint/2012/main" timeZoneBias="-60"/>
@@ -1238,7 +1307,7 @@
           </a:lstStyle>
           <a:p>
             <a:r>
-              <a:rPr lang="en-US" smtClean="0"/>
+              <a:rPr lang="en-US"/>
               <a:t>Click to edit Master title style</a:t>
             </a:r>
             <a:endParaRPr lang="en-US" dirty="0"/>
@@ -1312,7 +1381,7 @@
           </a:lstStyle>
           <a:p>
             <a:r>
-              <a:rPr lang="en-US" smtClean="0"/>
+              <a:rPr lang="en-US"/>
               <a:t>Click to edit Master subtitle style</a:t>
             </a:r>
             <a:endParaRPr lang="en-US" dirty="0"/>
@@ -1351,7 +1420,7 @@
           <a:p>
             <a:fld id="{A9B39056-BFEB-4A11-8C7A-993362657230}" type="datetimeFigureOut">
               <a:rPr lang="it-IT" smtClean="0"/>
-              <a:t>13/12/2016</a:t>
+              <a:t>14/12/2016</a:t>
             </a:fld>
             <a:endParaRPr lang="it-IT"/>
           </a:p>
@@ -1423,7 +1492,7 @@
           <a:p>
             <a:fld id="{7505EC97-943C-45B9-988A-B681FFEC0AEE}" type="slidenum">
               <a:rPr lang="it-IT" smtClean="0"/>
-              <a:t>‹#›</a:t>
+              <a:t>‹N›</a:t>
             </a:fld>
             <a:endParaRPr lang="it-IT"/>
           </a:p>
@@ -1551,7 +1620,7 @@
           <a:lstStyle/>
           <a:p>
             <a:r>
-              <a:rPr lang="en-US" smtClean="0"/>
+              <a:rPr lang="en-US"/>
               <a:t>Click to edit Master title style</a:t>
             </a:r>
             <a:endParaRPr lang="en-US" dirty="0"/>
@@ -1575,35 +1644,35 @@
           <a:p>
             <a:pPr lvl="0"/>
             <a:r>
-              <a:rPr lang="en-US" smtClean="0"/>
+              <a:rPr lang="en-US"/>
               <a:t>Edit Master text styles</a:t>
             </a:r>
           </a:p>
           <a:p>
             <a:pPr lvl="1"/>
             <a:r>
-              <a:rPr lang="en-US" smtClean="0"/>
+              <a:rPr lang="en-US"/>
               <a:t>Second level</a:t>
             </a:r>
           </a:p>
           <a:p>
             <a:pPr lvl="2"/>
             <a:r>
-              <a:rPr lang="en-US" smtClean="0"/>
+              <a:rPr lang="en-US"/>
               <a:t>Third level</a:t>
             </a:r>
           </a:p>
           <a:p>
             <a:pPr lvl="3"/>
             <a:r>
-              <a:rPr lang="en-US" smtClean="0"/>
+              <a:rPr lang="en-US"/>
               <a:t>Fourth level</a:t>
             </a:r>
           </a:p>
           <a:p>
             <a:pPr lvl="4"/>
             <a:r>
-              <a:rPr lang="en-US" smtClean="0"/>
+              <a:rPr lang="en-US"/>
               <a:t>Fifth level</a:t>
             </a:r>
             <a:endParaRPr lang="en-US" dirty="0"/>
@@ -1627,7 +1696,7 @@
           <a:p>
             <a:fld id="{A9B39056-BFEB-4A11-8C7A-993362657230}" type="datetimeFigureOut">
               <a:rPr lang="it-IT" smtClean="0"/>
-              <a:t>13/12/2016</a:t>
+              <a:t>14/12/2016</a:t>
             </a:fld>
             <a:endParaRPr lang="it-IT"/>
           </a:p>
@@ -1669,7 +1738,7 @@
           <a:p>
             <a:fld id="{7505EC97-943C-45B9-988A-B681FFEC0AEE}" type="slidenum">
               <a:rPr lang="it-IT" smtClean="0"/>
-              <a:t>‹#›</a:t>
+              <a:t>‹N›</a:t>
             </a:fld>
             <a:endParaRPr lang="it-IT"/>
           </a:p>
@@ -1726,7 +1795,7 @@
           <a:lstStyle/>
           <a:p>
             <a:r>
-              <a:rPr lang="en-US" smtClean="0"/>
+              <a:rPr lang="en-US"/>
               <a:t>Click to edit Master title style</a:t>
             </a:r>
             <a:endParaRPr lang="en-US" dirty="0"/>
@@ -1755,35 +1824,35 @@
           <a:p>
             <a:pPr lvl="0"/>
             <a:r>
-              <a:rPr lang="en-US" smtClean="0"/>
+              <a:rPr lang="en-US"/>
               <a:t>Edit Master text styles</a:t>
             </a:r>
           </a:p>
           <a:p>
             <a:pPr lvl="1"/>
             <a:r>
-              <a:rPr lang="en-US" smtClean="0"/>
+              <a:rPr lang="en-US"/>
               <a:t>Second level</a:t>
             </a:r>
           </a:p>
           <a:p>
             <a:pPr lvl="2"/>
             <a:r>
-              <a:rPr lang="en-US" smtClean="0"/>
+              <a:rPr lang="en-US"/>
               <a:t>Third level</a:t>
             </a:r>
           </a:p>
           <a:p>
             <a:pPr lvl="3"/>
             <a:r>
-              <a:rPr lang="en-US" smtClean="0"/>
+              <a:rPr lang="en-US"/>
               <a:t>Fourth level</a:t>
             </a:r>
           </a:p>
           <a:p>
             <a:pPr lvl="4"/>
             <a:r>
-              <a:rPr lang="en-US" smtClean="0"/>
+              <a:rPr lang="en-US"/>
               <a:t>Fifth level</a:t>
             </a:r>
             <a:endParaRPr lang="en-US" dirty="0"/>
@@ -1807,7 +1876,7 @@
           <a:p>
             <a:fld id="{A9B39056-BFEB-4A11-8C7A-993362657230}" type="datetimeFigureOut">
               <a:rPr lang="it-IT" smtClean="0"/>
-              <a:t>13/12/2016</a:t>
+              <a:t>14/12/2016</a:t>
             </a:fld>
             <a:endParaRPr lang="it-IT"/>
           </a:p>
@@ -1849,7 +1918,7 @@
           <a:p>
             <a:fld id="{7505EC97-943C-45B9-988A-B681FFEC0AEE}" type="slidenum">
               <a:rPr lang="it-IT" smtClean="0"/>
-              <a:t>‹#›</a:t>
+              <a:t>‹N›</a:t>
             </a:fld>
             <a:endParaRPr lang="it-IT"/>
           </a:p>
@@ -1901,7 +1970,7 @@
           <a:lstStyle/>
           <a:p>
             <a:r>
-              <a:rPr lang="en-US" smtClean="0"/>
+              <a:rPr lang="en-US"/>
               <a:t>Click to edit Master title style</a:t>
             </a:r>
             <a:endParaRPr lang="en-US" dirty="0"/>
@@ -1925,35 +1994,35 @@
           <a:p>
             <a:pPr lvl="0"/>
             <a:r>
-              <a:rPr lang="en-US" smtClean="0"/>
+              <a:rPr lang="en-US"/>
               <a:t>Edit Master text styles</a:t>
             </a:r>
           </a:p>
           <a:p>
             <a:pPr lvl="1"/>
             <a:r>
-              <a:rPr lang="en-US" smtClean="0"/>
+              <a:rPr lang="en-US"/>
               <a:t>Second level</a:t>
             </a:r>
           </a:p>
           <a:p>
             <a:pPr lvl="2"/>
             <a:r>
-              <a:rPr lang="en-US" smtClean="0"/>
+              <a:rPr lang="en-US"/>
               <a:t>Third level</a:t>
             </a:r>
           </a:p>
           <a:p>
             <a:pPr lvl="3"/>
             <a:r>
-              <a:rPr lang="en-US" smtClean="0"/>
+              <a:rPr lang="en-US"/>
               <a:t>Fourth level</a:t>
             </a:r>
           </a:p>
           <a:p>
             <a:pPr lvl="4"/>
             <a:r>
-              <a:rPr lang="en-US" smtClean="0"/>
+              <a:rPr lang="en-US"/>
               <a:t>Fifth level</a:t>
             </a:r>
             <a:endParaRPr lang="en-US" dirty="0"/>
@@ -1977,7 +2046,7 @@
           <a:p>
             <a:fld id="{A9B39056-BFEB-4A11-8C7A-993362657230}" type="datetimeFigureOut">
               <a:rPr lang="it-IT" smtClean="0"/>
-              <a:t>13/12/2016</a:t>
+              <a:t>14/12/2016</a:t>
             </a:fld>
             <a:endParaRPr lang="it-IT"/>
           </a:p>
@@ -2019,7 +2088,7 @@
           <a:p>
             <a:fld id="{7505EC97-943C-45B9-988A-B681FFEC0AEE}" type="slidenum">
               <a:rPr lang="it-IT" smtClean="0"/>
-              <a:t>‹#›</a:t>
+              <a:t>‹N›</a:t>
             </a:fld>
             <a:endParaRPr lang="it-IT"/>
           </a:p>
@@ -2414,7 +2483,7 @@
           </a:lstStyle>
           <a:p>
             <a:r>
-              <a:rPr lang="en-US" smtClean="0"/>
+              <a:rPr lang="en-US"/>
               <a:t>Click to edit Master title style</a:t>
             </a:r>
             <a:endParaRPr lang="en-US" dirty="0"/>
@@ -2537,7 +2606,7 @@
           <a:p>
             <a:pPr lvl="0"/>
             <a:r>
-              <a:rPr lang="en-US" smtClean="0"/>
+              <a:rPr lang="en-US"/>
               <a:t>Edit Master text styles</a:t>
             </a:r>
           </a:p>
@@ -2573,7 +2642,7 @@
           <a:p>
             <a:fld id="{A9B39056-BFEB-4A11-8C7A-993362657230}" type="datetimeFigureOut">
               <a:rPr lang="it-IT" smtClean="0"/>
-              <a:t>13/12/2016</a:t>
+              <a:t>14/12/2016</a:t>
             </a:fld>
             <a:endParaRPr lang="it-IT"/>
           </a:p>
@@ -2641,7 +2710,7 @@
           <a:p>
             <a:fld id="{7505EC97-943C-45B9-988A-B681FFEC0AEE}" type="slidenum">
               <a:rPr lang="it-IT" smtClean="0"/>
-              <a:t>‹#›</a:t>
+              <a:t>‹N›</a:t>
             </a:fld>
             <a:endParaRPr lang="it-IT"/>
           </a:p>
@@ -4241,7 +4310,7 @@
           <a:lstStyle/>
           <a:p>
             <a:r>
-              <a:rPr lang="en-US" smtClean="0"/>
+              <a:rPr lang="en-US"/>
               <a:t>Click to edit Master title style</a:t>
             </a:r>
             <a:endParaRPr lang="en-US" dirty="0"/>
@@ -4270,35 +4339,35 @@
           <a:p>
             <a:pPr lvl="0"/>
             <a:r>
-              <a:rPr lang="en-US" smtClean="0"/>
+              <a:rPr lang="en-US"/>
               <a:t>Edit Master text styles</a:t>
             </a:r>
           </a:p>
           <a:p>
             <a:pPr lvl="1"/>
             <a:r>
-              <a:rPr lang="en-US" smtClean="0"/>
+              <a:rPr lang="en-US"/>
               <a:t>Second level</a:t>
             </a:r>
           </a:p>
           <a:p>
             <a:pPr lvl="2"/>
             <a:r>
-              <a:rPr lang="en-US" smtClean="0"/>
+              <a:rPr lang="en-US"/>
               <a:t>Third level</a:t>
             </a:r>
           </a:p>
           <a:p>
             <a:pPr lvl="3"/>
             <a:r>
-              <a:rPr lang="en-US" smtClean="0"/>
+              <a:rPr lang="en-US"/>
               <a:t>Fourth level</a:t>
             </a:r>
           </a:p>
           <a:p>
             <a:pPr lvl="4"/>
             <a:r>
-              <a:rPr lang="en-US" smtClean="0"/>
+              <a:rPr lang="en-US"/>
               <a:t>Fifth level</a:t>
             </a:r>
             <a:endParaRPr lang="en-US" dirty="0"/>
@@ -4327,35 +4396,35 @@
           <a:p>
             <a:pPr lvl="0"/>
             <a:r>
-              <a:rPr lang="en-US" smtClean="0"/>
+              <a:rPr lang="en-US"/>
               <a:t>Edit Master text styles</a:t>
             </a:r>
           </a:p>
           <a:p>
             <a:pPr lvl="1"/>
             <a:r>
-              <a:rPr lang="en-US" smtClean="0"/>
+              <a:rPr lang="en-US"/>
               <a:t>Second level</a:t>
             </a:r>
           </a:p>
           <a:p>
             <a:pPr lvl="2"/>
             <a:r>
-              <a:rPr lang="en-US" smtClean="0"/>
+              <a:rPr lang="en-US"/>
               <a:t>Third level</a:t>
             </a:r>
           </a:p>
           <a:p>
             <a:pPr lvl="3"/>
             <a:r>
-              <a:rPr lang="en-US" smtClean="0"/>
+              <a:rPr lang="en-US"/>
               <a:t>Fourth level</a:t>
             </a:r>
           </a:p>
           <a:p>
             <a:pPr lvl="4"/>
             <a:r>
-              <a:rPr lang="en-US" smtClean="0"/>
+              <a:rPr lang="en-US"/>
               <a:t>Fifth level</a:t>
             </a:r>
             <a:endParaRPr lang="en-US" dirty="0"/>
@@ -4379,7 +4448,7 @@
           <a:p>
             <a:fld id="{A9B39056-BFEB-4A11-8C7A-993362657230}" type="datetimeFigureOut">
               <a:rPr lang="it-IT" smtClean="0"/>
-              <a:t>13/12/2016</a:t>
+              <a:t>14/12/2016</a:t>
             </a:fld>
             <a:endParaRPr lang="it-IT"/>
           </a:p>
@@ -4421,7 +4490,7 @@
           <a:p>
             <a:fld id="{7505EC97-943C-45B9-988A-B681FFEC0AEE}" type="slidenum">
               <a:rPr lang="it-IT" smtClean="0"/>
-              <a:t>‹#›</a:t>
+              <a:t>‹N›</a:t>
             </a:fld>
             <a:endParaRPr lang="it-IT"/>
           </a:p>
@@ -4483,7 +4552,7 @@
           <a:lstStyle/>
           <a:p>
             <a:r>
-              <a:rPr lang="en-US" smtClean="0"/>
+              <a:rPr lang="en-US"/>
               <a:t>Click to edit Master title style</a:t>
             </a:r>
             <a:endParaRPr lang="en-US" dirty="0"/>
@@ -4558,7 +4627,7 @@
           <a:p>
             <a:pPr lvl="0"/>
             <a:r>
-              <a:rPr lang="en-US" smtClean="0"/>
+              <a:rPr lang="en-US"/>
               <a:t>Edit Master text styles</a:t>
             </a:r>
           </a:p>
@@ -4586,35 +4655,35 @@
           <a:p>
             <a:pPr lvl="0"/>
             <a:r>
-              <a:rPr lang="en-US" smtClean="0"/>
+              <a:rPr lang="en-US"/>
               <a:t>Edit Master text styles</a:t>
             </a:r>
           </a:p>
           <a:p>
             <a:pPr lvl="1"/>
             <a:r>
-              <a:rPr lang="en-US" smtClean="0"/>
+              <a:rPr lang="en-US"/>
               <a:t>Second level</a:t>
             </a:r>
           </a:p>
           <a:p>
             <a:pPr lvl="2"/>
             <a:r>
-              <a:rPr lang="en-US" smtClean="0"/>
+              <a:rPr lang="en-US"/>
               <a:t>Third level</a:t>
             </a:r>
           </a:p>
           <a:p>
             <a:pPr lvl="3"/>
             <a:r>
-              <a:rPr lang="en-US" smtClean="0"/>
+              <a:rPr lang="en-US"/>
               <a:t>Fourth level</a:t>
             </a:r>
           </a:p>
           <a:p>
             <a:pPr lvl="4"/>
             <a:r>
-              <a:rPr lang="en-US" smtClean="0"/>
+              <a:rPr lang="en-US"/>
               <a:t>Fifth level</a:t>
             </a:r>
             <a:endParaRPr lang="en-US" dirty="0"/>
@@ -4689,7 +4758,7 @@
           <a:p>
             <a:pPr lvl="0"/>
             <a:r>
-              <a:rPr lang="en-US" smtClean="0"/>
+              <a:rPr lang="en-US"/>
               <a:t>Edit Master text styles</a:t>
             </a:r>
           </a:p>
@@ -4717,35 +4786,35 @@
           <a:p>
             <a:pPr lvl="0"/>
             <a:r>
-              <a:rPr lang="en-US" smtClean="0"/>
+              <a:rPr lang="en-US"/>
               <a:t>Edit Master text styles</a:t>
             </a:r>
           </a:p>
           <a:p>
             <a:pPr lvl="1"/>
             <a:r>
-              <a:rPr lang="en-US" smtClean="0"/>
+              <a:rPr lang="en-US"/>
               <a:t>Second level</a:t>
             </a:r>
           </a:p>
           <a:p>
             <a:pPr lvl="2"/>
             <a:r>
-              <a:rPr lang="en-US" smtClean="0"/>
+              <a:rPr lang="en-US"/>
               <a:t>Third level</a:t>
             </a:r>
           </a:p>
           <a:p>
             <a:pPr lvl="3"/>
             <a:r>
-              <a:rPr lang="en-US" smtClean="0"/>
+              <a:rPr lang="en-US"/>
               <a:t>Fourth level</a:t>
             </a:r>
           </a:p>
           <a:p>
             <a:pPr lvl="4"/>
             <a:r>
-              <a:rPr lang="en-US" smtClean="0"/>
+              <a:rPr lang="en-US"/>
               <a:t>Fifth level</a:t>
             </a:r>
             <a:endParaRPr lang="en-US" dirty="0"/>
@@ -4769,7 +4838,7 @@
           <a:p>
             <a:fld id="{A9B39056-BFEB-4A11-8C7A-993362657230}" type="datetimeFigureOut">
               <a:rPr lang="it-IT" smtClean="0"/>
-              <a:t>13/12/2016</a:t>
+              <a:t>14/12/2016</a:t>
             </a:fld>
             <a:endParaRPr lang="it-IT"/>
           </a:p>
@@ -4811,7 +4880,7 @@
           <a:p>
             <a:fld id="{7505EC97-943C-45B9-988A-B681FFEC0AEE}" type="slidenum">
               <a:rPr lang="it-IT" smtClean="0"/>
-              <a:t>‹#›</a:t>
+              <a:t>‹N›</a:t>
             </a:fld>
             <a:endParaRPr lang="it-IT"/>
           </a:p>
@@ -4868,7 +4937,7 @@
           <a:lstStyle/>
           <a:p>
             <a:r>
-              <a:rPr lang="en-US" smtClean="0"/>
+              <a:rPr lang="en-US"/>
               <a:t>Click to edit Master title style</a:t>
             </a:r>
             <a:endParaRPr lang="en-US" dirty="0"/>
@@ -4892,7 +4961,7 @@
           <a:p>
             <a:fld id="{A9B39056-BFEB-4A11-8C7A-993362657230}" type="datetimeFigureOut">
               <a:rPr lang="it-IT" smtClean="0"/>
-              <a:t>13/12/2016</a:t>
+              <a:t>14/12/2016</a:t>
             </a:fld>
             <a:endParaRPr lang="it-IT"/>
           </a:p>
@@ -4934,7 +5003,7 @@
           <a:p>
             <a:fld id="{7505EC97-943C-45B9-988A-B681FFEC0AEE}" type="slidenum">
               <a:rPr lang="it-IT" smtClean="0"/>
-              <a:t>‹#›</a:t>
+              <a:t>‹N›</a:t>
             </a:fld>
             <a:endParaRPr lang="it-IT"/>
           </a:p>
@@ -4987,7 +5056,7 @@
           <a:p>
             <a:fld id="{A9B39056-BFEB-4A11-8C7A-993362657230}" type="datetimeFigureOut">
               <a:rPr lang="it-IT" smtClean="0"/>
-              <a:t>13/12/2016</a:t>
+              <a:t>14/12/2016</a:t>
             </a:fld>
             <a:endParaRPr lang="it-IT"/>
           </a:p>
@@ -5029,7 +5098,7 @@
           <a:p>
             <a:fld id="{7505EC97-943C-45B9-988A-B681FFEC0AEE}" type="slidenum">
               <a:rPr lang="it-IT" smtClean="0"/>
-              <a:t>‹#›</a:t>
+              <a:t>‹N›</a:t>
             </a:fld>
             <a:endParaRPr lang="it-IT"/>
           </a:p>
@@ -5561,7 +5630,7 @@
           </a:lstStyle>
           <a:p>
             <a:r>
-              <a:rPr lang="en-US" smtClean="0"/>
+              <a:rPr lang="en-US"/>
               <a:t>Click to edit Master title style</a:t>
             </a:r>
             <a:endParaRPr lang="en-US" dirty="0"/>
@@ -5618,35 +5687,35 @@
           <a:p>
             <a:pPr lvl="0"/>
             <a:r>
-              <a:rPr lang="en-US" smtClean="0"/>
+              <a:rPr lang="en-US"/>
               <a:t>Edit Master text styles</a:t>
             </a:r>
           </a:p>
           <a:p>
             <a:pPr lvl="1"/>
             <a:r>
-              <a:rPr lang="en-US" smtClean="0"/>
+              <a:rPr lang="en-US"/>
               <a:t>Second level</a:t>
             </a:r>
           </a:p>
           <a:p>
             <a:pPr lvl="2"/>
             <a:r>
-              <a:rPr lang="en-US" smtClean="0"/>
+              <a:rPr lang="en-US"/>
               <a:t>Third level</a:t>
             </a:r>
           </a:p>
           <a:p>
             <a:pPr lvl="3"/>
             <a:r>
-              <a:rPr lang="en-US" smtClean="0"/>
+              <a:rPr lang="en-US"/>
               <a:t>Fourth level</a:t>
             </a:r>
           </a:p>
           <a:p>
             <a:pPr lvl="4"/>
             <a:r>
-              <a:rPr lang="en-US" smtClean="0"/>
+              <a:rPr lang="en-US"/>
               <a:t>Fifth level</a:t>
             </a:r>
             <a:endParaRPr lang="en-US" dirty="0"/>
@@ -5724,7 +5793,7 @@
           <a:p>
             <a:pPr lvl="0"/>
             <a:r>
-              <a:rPr lang="en-US" smtClean="0"/>
+              <a:rPr lang="en-US"/>
               <a:t>Edit Master text styles</a:t>
             </a:r>
           </a:p>
@@ -5752,7 +5821,7 @@
           <a:p>
             <a:fld id="{A9B39056-BFEB-4A11-8C7A-993362657230}" type="datetimeFigureOut">
               <a:rPr lang="it-IT" smtClean="0"/>
-              <a:t>13/12/2016</a:t>
+              <a:t>14/12/2016</a:t>
             </a:fld>
             <a:endParaRPr lang="it-IT"/>
           </a:p>
@@ -5804,7 +5873,7 @@
           <a:p>
             <a:fld id="{7505EC97-943C-45B9-988A-B681FFEC0AEE}" type="slidenum">
               <a:rPr lang="it-IT" smtClean="0"/>
-              <a:t>‹#›</a:t>
+              <a:t>‹N›</a:t>
             </a:fld>
             <a:endParaRPr lang="it-IT"/>
           </a:p>
@@ -5985,7 +6054,7 @@
           </a:lstStyle>
           <a:p>
             <a:r>
-              <a:rPr lang="en-US" smtClean="0"/>
+              <a:rPr lang="en-US"/>
               <a:t>Click icon to add picture</a:t>
             </a:r>
             <a:endParaRPr lang="en-US" dirty="0"/>
@@ -6526,7 +6595,7 @@
           </a:lstStyle>
           <a:p>
             <a:r>
-              <a:rPr lang="en-US" smtClean="0"/>
+              <a:rPr lang="en-US"/>
               <a:t>Click to edit Master title style</a:t>
             </a:r>
             <a:endParaRPr lang="en-US" dirty="0"/>
@@ -6604,7 +6673,7 @@
           <a:p>
             <a:pPr lvl="0"/>
             <a:r>
-              <a:rPr lang="en-US" smtClean="0"/>
+              <a:rPr lang="en-US"/>
               <a:t>Edit Master text styles</a:t>
             </a:r>
           </a:p>
@@ -6632,7 +6701,7 @@
           <a:p>
             <a:fld id="{A9B39056-BFEB-4A11-8C7A-993362657230}" type="datetimeFigureOut">
               <a:rPr lang="it-IT" smtClean="0"/>
-              <a:t>13/12/2016</a:t>
+              <a:t>14/12/2016</a:t>
             </a:fld>
             <a:endParaRPr lang="it-IT"/>
           </a:p>
@@ -6684,7 +6753,7 @@
           <a:p>
             <a:fld id="{7505EC97-943C-45B9-988A-B681FFEC0AEE}" type="slidenum">
               <a:rPr lang="it-IT" smtClean="0"/>
-              <a:t>‹#›</a:t>
+              <a:t>‹N›</a:t>
             </a:fld>
             <a:endParaRPr lang="it-IT"/>
           </a:p>
@@ -6792,7 +6861,7 @@
           <a:lstStyle/>
           <a:p>
             <a:r>
-              <a:rPr lang="en-US" smtClean="0"/>
+              <a:rPr lang="en-US"/>
               <a:t>Click to edit Master title style</a:t>
             </a:r>
             <a:endParaRPr lang="en-US" dirty="0"/>
@@ -6826,35 +6895,35 @@
           <a:p>
             <a:pPr lvl="0"/>
             <a:r>
-              <a:rPr lang="en-US" smtClean="0"/>
+              <a:rPr lang="en-US"/>
               <a:t>Edit Master text styles</a:t>
             </a:r>
           </a:p>
           <a:p>
             <a:pPr lvl="1"/>
             <a:r>
-              <a:rPr lang="en-US" smtClean="0"/>
+              <a:rPr lang="en-US"/>
               <a:t>Second level</a:t>
             </a:r>
           </a:p>
           <a:p>
             <a:pPr lvl="2"/>
             <a:r>
-              <a:rPr lang="en-US" smtClean="0"/>
+              <a:rPr lang="en-US"/>
               <a:t>Third level</a:t>
             </a:r>
           </a:p>
           <a:p>
             <a:pPr lvl="3"/>
             <a:r>
-              <a:rPr lang="en-US" smtClean="0"/>
+              <a:rPr lang="en-US"/>
               <a:t>Fourth level</a:t>
             </a:r>
           </a:p>
           <a:p>
             <a:pPr lvl="4"/>
             <a:r>
-              <a:rPr lang="en-US" smtClean="0"/>
+              <a:rPr lang="en-US"/>
               <a:t>Fifth level</a:t>
             </a:r>
             <a:endParaRPr lang="en-US" dirty="0"/>
@@ -6897,7 +6966,7 @@
           <a:p>
             <a:fld id="{A9B39056-BFEB-4A11-8C7A-993362657230}" type="datetimeFigureOut">
               <a:rPr lang="it-IT" smtClean="0"/>
-              <a:t>13/12/2016</a:t>
+              <a:t>14/12/2016</a:t>
             </a:fld>
             <a:endParaRPr lang="it-IT"/>
           </a:p>
@@ -6977,7 +7046,7 @@
           <a:p>
             <a:fld id="{7505EC97-943C-45B9-988A-B681FFEC0AEE}" type="slidenum">
               <a:rPr lang="it-IT" smtClean="0"/>
-              <a:t>‹#›</a:t>
+              <a:t>‹N›</a:t>
             </a:fld>
             <a:endParaRPr lang="it-IT"/>
           </a:p>
@@ -7630,9 +7699,17 @@
 </p:sld>
 </file>
 
-<file path=ppt/slides/slide2.xml><?xml version="1.0" encoding="utf-8"?>
+<file path=ppt/slides/slide10.xml><?xml version="1.0" encoding="utf-8"?>
 <p:sld xmlns:a="http://schemas.openxmlformats.org/drawingml/2006/main" xmlns:r="http://schemas.openxmlformats.org/officeDocument/2006/relationships" xmlns:p="http://schemas.openxmlformats.org/presentationml/2006/main">
   <p:cSld>
+    <p:bg>
+      <p:bgPr>
+        <a:solidFill>
+          <a:schemeClr val="bg1"/>
+        </a:solidFill>
+        <a:effectLst/>
+      </p:bgPr>
+    </p:bg>
     <p:spTree>
       <p:nvGrpSpPr>
         <p:cNvPr id="1" name=""/>
@@ -7663,10 +7740,252 @@
           <a:lstStyle/>
           <a:p>
             <a:r>
-              <a:rPr lang="it-IT" dirty="0" smtClean="0"/>
+              <a:rPr lang="it-IT" dirty="0" err="1"/>
+              <a:t>algorithms</a:t>
+            </a:r>
+            <a:endParaRPr lang="it-IT" dirty="0"/>
+          </a:p>
+        </p:txBody>
+      </p:sp>
+      <p:sp>
+        <p:nvSpPr>
+          <p:cNvPr id="3" name="Content Placeholder 2"/>
+          <p:cNvSpPr>
+            <a:spLocks noGrp="1"/>
+          </p:cNvSpPr>
+          <p:nvPr>
+            <p:ph idx="1"/>
+          </p:nvPr>
+        </p:nvSpPr>
+        <p:spPr/>
+        <p:txBody>
+          <a:bodyPr/>
+          <a:lstStyle/>
+          <a:p>
+            <a:endParaRPr lang="it-IT"/>
+          </a:p>
+        </p:txBody>
+      </p:sp>
+    </p:spTree>
+    <p:extLst>
+      <p:ext uri="{BB962C8B-B14F-4D97-AF65-F5344CB8AC3E}">
+        <p14:creationId xmlns:p14="http://schemas.microsoft.com/office/powerpoint/2010/main" val="1548315155"/>
+      </p:ext>
+    </p:extLst>
+  </p:cSld>
+  <p:clrMapOvr>
+    <a:masterClrMapping/>
+  </p:clrMapOvr>
+</p:sld>
+</file>
+
+<file path=ppt/slides/slide11.xml><?xml version="1.0" encoding="utf-8"?>
+<p:sld xmlns:a="http://schemas.openxmlformats.org/drawingml/2006/main" xmlns:r="http://schemas.openxmlformats.org/officeDocument/2006/relationships" xmlns:p="http://schemas.openxmlformats.org/presentationml/2006/main">
+  <p:cSld>
+    <p:bg>
+      <p:bgPr>
+        <a:solidFill>
+          <a:schemeClr val="bg1"/>
+        </a:solidFill>
+        <a:effectLst/>
+      </p:bgPr>
+    </p:bg>
+    <p:spTree>
+      <p:nvGrpSpPr>
+        <p:cNvPr id="1" name=""/>
+        <p:cNvGrpSpPr/>
+        <p:nvPr/>
+      </p:nvGrpSpPr>
+      <p:grpSpPr>
+        <a:xfrm>
+          <a:off x="0" y="0"/>
+          <a:ext cx="0" cy="0"/>
+          <a:chOff x="0" y="0"/>
+          <a:chExt cx="0" cy="0"/>
+        </a:xfrm>
+      </p:grpSpPr>
+      <p:sp>
+        <p:nvSpPr>
+          <p:cNvPr id="2" name="Title 1"/>
+          <p:cNvSpPr>
+            <a:spLocks noGrp="1"/>
+          </p:cNvSpPr>
+          <p:nvPr>
+            <p:ph type="title"/>
+          </p:nvPr>
+        </p:nvSpPr>
+        <p:spPr/>
+        <p:txBody>
+          <a:bodyPr/>
+          <a:lstStyle/>
+          <a:p>
+            <a:r>
+              <a:rPr lang="it-IT" dirty="0" err="1"/>
+              <a:t>Ux</a:t>
+            </a:r>
+            <a:r>
+              <a:rPr lang="it-IT" dirty="0"/>
+              <a:t> </a:t>
+            </a:r>
+            <a:r>
+              <a:rPr lang="it-IT" dirty="0" err="1"/>
+              <a:t>diagrams</a:t>
+            </a:r>
+            <a:endParaRPr lang="it-IT" dirty="0"/>
+          </a:p>
+        </p:txBody>
+      </p:sp>
+      <p:pic>
+        <p:nvPicPr>
+          <p:cNvPr id="4" name="Segnaposto contenuto 3"/>
+          <p:cNvPicPr>
+            <a:picLocks noGrp="1" noChangeAspect="1"/>
+          </p:cNvPicPr>
+          <p:nvPr>
+            <p:ph idx="1"/>
+          </p:nvPr>
+        </p:nvPicPr>
+        <p:blipFill>
+          <a:blip r:embed="rId2">
+            <a:extLst>
+              <a:ext uri="{28A0092B-C50C-407E-A947-70E740481C1C}">
+                <a14:useLocalDpi xmlns:a14="http://schemas.microsoft.com/office/drawing/2010/main" val="0"/>
+              </a:ext>
+            </a:extLst>
+          </a:blip>
+          <a:stretch>
+            <a:fillRect/>
+          </a:stretch>
+        </p:blipFill>
+        <p:spPr>
+          <a:xfrm>
+            <a:off x="1062216" y="1874517"/>
+            <a:ext cx="5033845" cy="3640666"/>
+          </a:xfrm>
+        </p:spPr>
+      </p:pic>
+    </p:spTree>
+    <p:extLst>
+      <p:ext uri="{BB962C8B-B14F-4D97-AF65-F5344CB8AC3E}">
+        <p14:creationId xmlns:p14="http://schemas.microsoft.com/office/powerpoint/2010/main" val="2569506512"/>
+      </p:ext>
+    </p:extLst>
+  </p:cSld>
+  <p:clrMapOvr>
+    <a:masterClrMapping/>
+  </p:clrMapOvr>
+</p:sld>
+</file>
+
+<file path=ppt/slides/slide12.xml><?xml version="1.0" encoding="utf-8"?>
+<p:sld xmlns:a="http://schemas.openxmlformats.org/drawingml/2006/main" xmlns:r="http://schemas.openxmlformats.org/officeDocument/2006/relationships" xmlns:p="http://schemas.openxmlformats.org/presentationml/2006/main">
+  <p:cSld>
+    <p:bg>
+      <p:bgPr>
+        <a:solidFill>
+          <a:schemeClr val="bg1"/>
+        </a:solidFill>
+        <a:effectLst/>
+      </p:bgPr>
+    </p:bg>
+    <p:spTree>
+      <p:nvGrpSpPr>
+        <p:cNvPr id="1" name=""/>
+        <p:cNvGrpSpPr/>
+        <p:nvPr/>
+      </p:nvGrpSpPr>
+      <p:grpSpPr>
+        <a:xfrm>
+          <a:off x="0" y="0"/>
+          <a:ext cx="0" cy="0"/>
+          <a:chOff x="0" y="0"/>
+          <a:chExt cx="0" cy="0"/>
+        </a:xfrm>
+      </p:grpSpPr>
+      <p:sp>
+        <p:nvSpPr>
+          <p:cNvPr id="2" name="Title 1"/>
+          <p:cNvSpPr>
+            <a:spLocks noGrp="1"/>
+          </p:cNvSpPr>
+          <p:nvPr>
+            <p:ph type="title"/>
+          </p:nvPr>
+        </p:nvSpPr>
+        <p:spPr>
+          <a:xfrm>
+            <a:off x="2850685" y="2733700"/>
+            <a:ext cx="3740120" cy="1492132"/>
+          </a:xfrm>
+        </p:spPr>
+        <p:txBody>
+          <a:bodyPr/>
+          <a:lstStyle/>
+          <a:p>
+            <a:r>
+              <a:rPr lang="it-IT" dirty="0"/>
+              <a:t>Questions?</a:t>
+            </a:r>
+          </a:p>
+        </p:txBody>
+      </p:sp>
+    </p:spTree>
+    <p:extLst>
+      <p:ext uri="{BB962C8B-B14F-4D97-AF65-F5344CB8AC3E}">
+        <p14:creationId xmlns:p14="http://schemas.microsoft.com/office/powerpoint/2010/main" val="710917353"/>
+      </p:ext>
+    </p:extLst>
+  </p:cSld>
+  <p:clrMapOvr>
+    <a:masterClrMapping/>
+  </p:clrMapOvr>
+</p:sld>
+</file>
+
+<file path=ppt/slides/slide2.xml><?xml version="1.0" encoding="utf-8"?>
+<p:sld xmlns:a="http://schemas.openxmlformats.org/drawingml/2006/main" xmlns:r="http://schemas.openxmlformats.org/officeDocument/2006/relationships" xmlns:p="http://schemas.openxmlformats.org/presentationml/2006/main">
+  <p:cSld>
+    <p:bg>
+      <p:bgPr>
+        <a:solidFill>
+          <a:schemeClr val="bg1"/>
+        </a:solidFill>
+        <a:effectLst/>
+      </p:bgPr>
+    </p:bg>
+    <p:spTree>
+      <p:nvGrpSpPr>
+        <p:cNvPr id="1" name=""/>
+        <p:cNvGrpSpPr/>
+        <p:nvPr/>
+      </p:nvGrpSpPr>
+      <p:grpSpPr>
+        <a:xfrm>
+          <a:off x="0" y="0"/>
+          <a:ext cx="0" cy="0"/>
+          <a:chOff x="0" y="0"/>
+          <a:chExt cx="0" cy="0"/>
+        </a:xfrm>
+      </p:grpSpPr>
+      <p:sp>
+        <p:nvSpPr>
+          <p:cNvPr id="2" name="Title 1"/>
+          <p:cNvSpPr>
+            <a:spLocks noGrp="1"/>
+          </p:cNvSpPr>
+          <p:nvPr>
+            <p:ph type="title"/>
+          </p:nvPr>
+        </p:nvSpPr>
+        <p:spPr/>
+        <p:txBody>
+          <a:bodyPr/>
+          <a:lstStyle/>
+          <a:p>
+            <a:r>
+              <a:rPr lang="it-IT" dirty="0"/>
               <a:t>Overall system</a:t>
             </a:r>
-            <a:endParaRPr lang="it-IT" dirty="0"/>
           </a:p>
         </p:txBody>
       </p:sp>
@@ -7693,8 +8012,8 @@
         </p:blipFill>
         <p:spPr>
           <a:xfrm>
-            <a:off x="2196496" y="1638794"/>
-            <a:ext cx="5118265" cy="4832329"/>
+            <a:off x="1953825" y="1387956"/>
+            <a:ext cx="5260706" cy="4966813"/>
           </a:xfrm>
         </p:spPr>
       </p:pic>
@@ -7714,6 +8033,14 @@
 <file path=ppt/slides/slide3.xml><?xml version="1.0" encoding="utf-8"?>
 <p:sld xmlns:a="http://schemas.openxmlformats.org/drawingml/2006/main" xmlns:r="http://schemas.openxmlformats.org/officeDocument/2006/relationships" xmlns:p="http://schemas.openxmlformats.org/presentationml/2006/main">
   <p:cSld>
+    <p:bg>
+      <p:bgPr>
+        <a:solidFill>
+          <a:schemeClr val="bg1"/>
+        </a:solidFill>
+        <a:effectLst/>
+      </p:bgPr>
+    </p:bg>
     <p:spTree>
       <p:nvGrpSpPr>
         <p:cNvPr id="1" name=""/>
@@ -7738,16 +8065,330 @@
             <p:ph type="title"/>
           </p:nvPr>
         </p:nvSpPr>
+        <p:spPr>
+          <a:xfrm>
+            <a:off x="938758" y="382385"/>
+            <a:ext cx="7633742" cy="1492132"/>
+          </a:xfrm>
+        </p:spPr>
+        <p:txBody>
+          <a:bodyPr>
+            <a:normAutofit/>
+          </a:bodyPr>
+          <a:lstStyle/>
+          <a:p>
+            <a:r>
+              <a:rPr lang="it-IT" dirty="0" err="1"/>
+              <a:t>Overall</a:t>
+            </a:r>
+            <a:r>
+              <a:rPr lang="it-IT" dirty="0"/>
+              <a:t> system</a:t>
+            </a:r>
+            <a:br>
+              <a:rPr lang="it-IT" dirty="0"/>
+            </a:br>
+            <a:r>
+              <a:rPr lang="en-GB" sz="3200" b="1" dirty="0"/>
+              <a:t>THREE-TIER ARCHITECTURE</a:t>
+            </a:r>
+            <a:endParaRPr lang="it-IT" dirty="0"/>
+          </a:p>
+        </p:txBody>
+      </p:sp>
+      <p:sp>
+        <p:nvSpPr>
+          <p:cNvPr id="5" name="Segnaposto contenuto 4"/>
+          <p:cNvSpPr>
+            <a:spLocks noGrp="1"/>
+          </p:cNvSpPr>
+          <p:nvPr>
+            <p:ph idx="1"/>
+          </p:nvPr>
+        </p:nvSpPr>
+        <p:spPr>
+          <a:xfrm>
+            <a:off x="4915950" y="2080470"/>
+            <a:ext cx="3741489" cy="1195502"/>
+          </a:xfrm>
+        </p:spPr>
+        <p:txBody>
+          <a:bodyPr>
+            <a:normAutofit/>
+          </a:bodyPr>
+          <a:lstStyle/>
+          <a:p>
+            <a:pPr marL="0" indent="0">
+              <a:spcBef>
+                <a:spcPts val="0"/>
+              </a:spcBef>
+              <a:buNone/>
+            </a:pPr>
+            <a:r>
+              <a:rPr lang="en-GB" sz="1400" b="1" dirty="0">
+                <a:solidFill>
+                  <a:schemeClr val="accent2">
+                    <a:lumMod val="75000"/>
+                  </a:schemeClr>
+                </a:solidFill>
+              </a:rPr>
+              <a:t>PRESENTATION TIER</a:t>
+            </a:r>
+          </a:p>
+          <a:p>
+            <a:pPr marL="0" indent="0">
+              <a:spcBef>
+                <a:spcPts val="0"/>
+              </a:spcBef>
+              <a:buNone/>
+            </a:pPr>
+            <a:r>
+              <a:rPr lang="en-GB" sz="1400" dirty="0">
+                <a:solidFill>
+                  <a:schemeClr val="accent2">
+                    <a:lumMod val="75000"/>
+                  </a:schemeClr>
+                </a:solidFill>
+              </a:rPr>
+              <a:t>The views are provided to the users and operators through the application on their mobile phones.</a:t>
+            </a:r>
+          </a:p>
+        </p:txBody>
+      </p:sp>
+      <p:pic>
+        <p:nvPicPr>
+          <p:cNvPr id="6" name="Immagine 5"/>
+          <p:cNvPicPr>
+            <a:picLocks noChangeAspect="1"/>
+          </p:cNvPicPr>
+          <p:nvPr/>
+        </p:nvPicPr>
+        <p:blipFill rotWithShape="1">
+          <a:blip r:embed="rId2" cstate="print">
+            <a:extLst>
+              <a:ext uri="{28A0092B-C50C-407E-A947-70E740481C1C}">
+                <a14:useLocalDpi xmlns:a14="http://schemas.microsoft.com/office/drawing/2010/main" val="0"/>
+              </a:ext>
+            </a:extLst>
+          </a:blip>
+          <a:srcRect l="15048" t="13456" r="16605" b="35168"/>
+          <a:stretch/>
+        </p:blipFill>
+        <p:spPr>
+          <a:xfrm>
+            <a:off x="745572" y="1741894"/>
+            <a:ext cx="4170378" cy="4434327"/>
+          </a:xfrm>
+          <a:prstGeom prst="rect">
+            <a:avLst/>
+          </a:prstGeom>
+        </p:spPr>
+      </p:pic>
+      <p:sp>
+        <p:nvSpPr>
+          <p:cNvPr id="7" name="CasellaDiTesto 6"/>
+          <p:cNvSpPr txBox="1"/>
+          <p:nvPr/>
+        </p:nvSpPr>
+        <p:spPr>
+          <a:xfrm>
+            <a:off x="4915950" y="3479652"/>
+            <a:ext cx="3741489" cy="954107"/>
+          </a:xfrm>
+          <a:prstGeom prst="rect">
+            <a:avLst/>
+          </a:prstGeom>
+          <a:noFill/>
+        </p:spPr>
+        <p:txBody>
+          <a:bodyPr wrap="square" rtlCol="0">
+            <a:spAutoFit/>
+          </a:bodyPr>
+          <a:lstStyle/>
+          <a:p>
+            <a:r>
+              <a:rPr lang="en-GB" sz="1400" b="1" dirty="0">
+                <a:solidFill>
+                  <a:schemeClr val="accent2">
+                    <a:lumMod val="75000"/>
+                  </a:schemeClr>
+                </a:solidFill>
+              </a:rPr>
+              <a:t>BUSINESS LOGIC TIER</a:t>
+            </a:r>
+          </a:p>
+          <a:p>
+            <a:r>
+              <a:rPr lang="en-GB" sz="1400" dirty="0">
+                <a:solidFill>
+                  <a:schemeClr val="accent2">
+                    <a:lumMod val="75000"/>
+                  </a:schemeClr>
+                </a:solidFill>
+              </a:rPr>
+              <a:t>The Central System contains the main logic of the application and communicates with the user devices and the Data System.</a:t>
+            </a:r>
+          </a:p>
+        </p:txBody>
+      </p:sp>
+      <p:sp>
+        <p:nvSpPr>
+          <p:cNvPr id="11" name="CasellaDiTesto 10"/>
+          <p:cNvSpPr txBox="1"/>
+          <p:nvPr/>
+        </p:nvSpPr>
+        <p:spPr>
+          <a:xfrm>
+            <a:off x="4915950" y="4773336"/>
+            <a:ext cx="3741489" cy="1169551"/>
+          </a:xfrm>
+          <a:prstGeom prst="rect">
+            <a:avLst/>
+          </a:prstGeom>
+          <a:noFill/>
+        </p:spPr>
+        <p:txBody>
+          <a:bodyPr wrap="square" rtlCol="0">
+            <a:spAutoFit/>
+          </a:bodyPr>
+          <a:lstStyle/>
+          <a:p>
+            <a:r>
+              <a:rPr lang="en-GB" sz="1400" b="1" dirty="0">
+                <a:solidFill>
+                  <a:schemeClr val="accent2">
+                    <a:lumMod val="75000"/>
+                  </a:schemeClr>
+                </a:solidFill>
+              </a:rPr>
+              <a:t>DATA TIER</a:t>
+            </a:r>
+            <a:endParaRPr lang="it-IT" sz="1400" b="1" dirty="0">
+              <a:solidFill>
+                <a:schemeClr val="accent2">
+                  <a:lumMod val="75000"/>
+                </a:schemeClr>
+              </a:solidFill>
+            </a:endParaRPr>
+          </a:p>
+          <a:p>
+            <a:r>
+              <a:rPr lang="en-GB" sz="1400" dirty="0">
+                <a:solidFill>
+                  <a:schemeClr val="accent2">
+                    <a:lumMod val="75000"/>
+                  </a:schemeClr>
+                </a:solidFill>
+              </a:rPr>
+              <a:t>The Data System </a:t>
+            </a:r>
+            <a:r>
+              <a:rPr lang="en-GB" sz="1400" b="1" i="1" dirty="0">
+                <a:solidFill>
+                  <a:schemeClr val="accent2">
+                    <a:lumMod val="75000"/>
+                  </a:schemeClr>
+                </a:solidFill>
+              </a:rPr>
+              <a:t>collects the data </a:t>
+            </a:r>
+            <a:r>
+              <a:rPr lang="en-GB" sz="1400" dirty="0">
+                <a:solidFill>
+                  <a:schemeClr val="accent2">
+                    <a:lumMod val="75000"/>
+                  </a:schemeClr>
+                </a:solidFill>
+              </a:rPr>
+              <a:t>of all the cars, users and operators into a database and </a:t>
+            </a:r>
+            <a:r>
+              <a:rPr lang="en-GB" sz="1400" b="1" i="1" dirty="0">
+                <a:solidFill>
+                  <a:schemeClr val="accent2">
+                    <a:lumMod val="75000"/>
+                  </a:schemeClr>
+                </a:solidFill>
+              </a:rPr>
+              <a:t>interacts with cars and power plugs</a:t>
+            </a:r>
+            <a:r>
+              <a:rPr lang="en-GB" sz="1400" dirty="0">
+                <a:solidFill>
+                  <a:schemeClr val="accent2">
+                    <a:lumMod val="75000"/>
+                  </a:schemeClr>
+                </a:solidFill>
+              </a:rPr>
+              <a:t> to change or get their status.</a:t>
+            </a:r>
+            <a:endParaRPr lang="it-IT" sz="1400" dirty="0">
+              <a:solidFill>
+                <a:schemeClr val="accent2">
+                  <a:lumMod val="75000"/>
+                </a:schemeClr>
+              </a:solidFill>
+            </a:endParaRPr>
+          </a:p>
+        </p:txBody>
+      </p:sp>
+    </p:spTree>
+    <p:extLst>
+      <p:ext uri="{BB962C8B-B14F-4D97-AF65-F5344CB8AC3E}">
+        <p14:creationId xmlns:p14="http://schemas.microsoft.com/office/powerpoint/2010/main" val="2090056884"/>
+      </p:ext>
+    </p:extLst>
+  </p:cSld>
+  <p:clrMapOvr>
+    <a:masterClrMapping/>
+  </p:clrMapOvr>
+</p:sld>
+</file>
+
+<file path=ppt/slides/slide4.xml><?xml version="1.0" encoding="utf-8"?>
+<p:sld xmlns:a="http://schemas.openxmlformats.org/drawingml/2006/main" xmlns:r="http://schemas.openxmlformats.org/officeDocument/2006/relationships" xmlns:p="http://schemas.openxmlformats.org/presentationml/2006/main">
+  <p:cSld>
+    <p:bg>
+      <p:bgPr>
+        <a:solidFill>
+          <a:schemeClr val="bg1"/>
+        </a:solidFill>
+        <a:effectLst/>
+      </p:bgPr>
+    </p:bg>
+    <p:spTree>
+      <p:nvGrpSpPr>
+        <p:cNvPr id="1" name=""/>
+        <p:cNvGrpSpPr/>
+        <p:nvPr/>
+      </p:nvGrpSpPr>
+      <p:grpSpPr>
+        <a:xfrm>
+          <a:off x="0" y="0"/>
+          <a:ext cx="0" cy="0"/>
+          <a:chOff x="0" y="0"/>
+          <a:chExt cx="0" cy="0"/>
+        </a:xfrm>
+      </p:grpSpPr>
+      <p:sp>
+        <p:nvSpPr>
+          <p:cNvPr id="2" name="Title 1"/>
+          <p:cNvSpPr>
+            <a:spLocks noGrp="1"/>
+          </p:cNvSpPr>
+          <p:nvPr>
+            <p:ph type="title"/>
+          </p:nvPr>
+        </p:nvSpPr>
         <p:spPr/>
         <p:txBody>
           <a:bodyPr/>
           <a:lstStyle/>
           <a:p>
             <a:r>
-              <a:rPr lang="it-IT" dirty="0" smtClean="0"/>
+              <a:rPr lang="it-IT" dirty="0"/>
               <a:t>Components</a:t>
             </a:r>
-            <a:endParaRPr lang="it-IT" dirty="0"/>
           </a:p>
         </p:txBody>
       </p:sp>
@@ -7793,9 +8434,17 @@
 </p:sld>
 </file>
 
-<file path=ppt/slides/slide4.xml><?xml version="1.0" encoding="utf-8"?>
+<file path=ppt/slides/slide5.xml><?xml version="1.0" encoding="utf-8"?>
 <p:sld xmlns:a="http://schemas.openxmlformats.org/drawingml/2006/main" xmlns:r="http://schemas.openxmlformats.org/officeDocument/2006/relationships" xmlns:p="http://schemas.openxmlformats.org/presentationml/2006/main">
   <p:cSld>
+    <p:bg>
+      <p:bgPr>
+        <a:solidFill>
+          <a:schemeClr val="bg1"/>
+        </a:solidFill>
+        <a:effectLst/>
+      </p:bgPr>
+    </p:bg>
     <p:spTree>
       <p:nvGrpSpPr>
         <p:cNvPr id="1" name=""/>
@@ -7826,10 +8475,9 @@
           <a:lstStyle/>
           <a:p>
             <a:r>
-              <a:rPr lang="it-IT" dirty="0" smtClean="0"/>
+              <a:rPr lang="it-IT" dirty="0"/>
               <a:t>Central application</a:t>
             </a:r>
-            <a:endParaRPr lang="it-IT" dirty="0"/>
           </a:p>
         </p:txBody>
       </p:sp>
@@ -7857,7 +8505,7 @@
         </p:blipFill>
         <p:spPr>
           <a:xfrm>
-            <a:off x="701252" y="1727860"/>
+            <a:off x="729864" y="1425856"/>
             <a:ext cx="8355413" cy="5272644"/>
           </a:xfrm>
         </p:spPr>
@@ -7875,9 +8523,17 @@
 </p:sld>
 </file>
 
-<file path=ppt/slides/slide5.xml><?xml version="1.0" encoding="utf-8"?>
+<file path=ppt/slides/slide6.xml><?xml version="1.0" encoding="utf-8"?>
 <p:sld xmlns:a="http://schemas.openxmlformats.org/drawingml/2006/main" xmlns:r="http://schemas.openxmlformats.org/officeDocument/2006/relationships" xmlns:p="http://schemas.openxmlformats.org/presentationml/2006/main">
   <p:cSld>
+    <p:bg>
+      <p:bgPr>
+        <a:solidFill>
+          <a:schemeClr val="bg1"/>
+        </a:solidFill>
+        <a:effectLst/>
+      </p:bgPr>
+    </p:bg>
     <p:spTree>
       <p:nvGrpSpPr>
         <p:cNvPr id="1" name=""/>
@@ -7908,10 +8564,9 @@
           <a:lstStyle/>
           <a:p>
             <a:r>
-              <a:rPr lang="it-IT" dirty="0" smtClean="0"/>
+              <a:rPr lang="it-IT" dirty="0"/>
               <a:t>persistence</a:t>
             </a:r>
-            <a:endParaRPr lang="it-IT" dirty="0"/>
           </a:p>
         </p:txBody>
       </p:sp>
@@ -7939,8 +8594,8 @@
         </p:blipFill>
         <p:spPr>
           <a:xfrm>
-            <a:off x="2985591" y="2040771"/>
-            <a:ext cx="3540075" cy="4041745"/>
+            <a:off x="5554550" y="2066171"/>
+            <a:ext cx="3017950" cy="3445629"/>
           </a:xfrm>
         </p:spPr>
       </p:pic>
@@ -7954,19 +8609,20 @@
   <p:clrMapOvr>
     <a:masterClrMapping/>
   </p:clrMapOvr>
-  <p:timing>
-    <p:tnLst>
-      <p:par>
-        <p:cTn id="1" dur="indefinite" restart="never" nodeType="tmRoot"/>
-      </p:par>
-    </p:tnLst>
-  </p:timing>
 </p:sld>
 </file>
 
-<file path=ppt/slides/slide6.xml><?xml version="1.0" encoding="utf-8"?>
+<file path=ppt/slides/slide7.xml><?xml version="1.0" encoding="utf-8"?>
 <p:sld xmlns:a="http://schemas.openxmlformats.org/drawingml/2006/main" xmlns:r="http://schemas.openxmlformats.org/officeDocument/2006/relationships" xmlns:p="http://schemas.openxmlformats.org/presentationml/2006/main">
   <p:cSld>
+    <p:bg>
+      <p:bgPr>
+        <a:solidFill>
+          <a:schemeClr val="bg1"/>
+        </a:solidFill>
+        <a:effectLst/>
+      </p:bgPr>
+    </p:bg>
     <p:spTree>
       <p:nvGrpSpPr>
         <p:cNvPr id="1" name=""/>
@@ -7991,12 +8647,35 @@
             <p:ph type="title"/>
           </p:nvPr>
         </p:nvSpPr>
-        <p:spPr/>
+        <p:spPr>
+          <a:xfrm>
+            <a:off x="938758" y="382386"/>
+            <a:ext cx="7633742" cy="762844"/>
+          </a:xfrm>
+        </p:spPr>
         <p:txBody>
-          <a:bodyPr/>
+          <a:bodyPr>
+            <a:noAutofit/>
+          </a:bodyPr>
           <a:lstStyle/>
           <a:p>
-            <a:endParaRPr lang="it-IT"/>
+            <a:r>
+              <a:rPr lang="it-IT" sz="4000" dirty="0"/>
+              <a:t>The </a:t>
+            </a:r>
+            <a:r>
+              <a:rPr lang="it-IT" sz="4000" dirty="0" err="1"/>
+              <a:t>runtime</a:t>
+            </a:r>
+            <a:r>
+              <a:rPr lang="it-IT" sz="4000" dirty="0"/>
+              <a:t> </a:t>
+            </a:r>
+            <a:r>
+              <a:rPr lang="it-IT" sz="4000" dirty="0" err="1"/>
+              <a:t>view</a:t>
+            </a:r>
+            <a:endParaRPr lang="it-IT" sz="4000" dirty="0"/>
           </a:p>
         </p:txBody>
       </p:sp>
@@ -8010,7 +8689,7 @@
             <p:ph idx="1"/>
           </p:nvPr>
         </p:nvPicPr>
-        <p:blipFill>
+        <p:blipFill rotWithShape="1">
           <a:blip r:embed="rId2" cstate="print">
             <a:extLst>
               <a:ext uri="{28A0092B-C50C-407E-A947-70E740481C1C}">
@@ -8018,14 +8697,13 @@
               </a:ext>
             </a:extLst>
           </a:blip>
-          <a:stretch>
-            <a:fillRect/>
-          </a:stretch>
+          <a:srcRect l="799" t="1192" r="8633" b="5524"/>
+          <a:stretch/>
         </p:blipFill>
         <p:spPr>
           <a:xfrm>
-            <a:off x="761506" y="1252846"/>
-            <a:ext cx="8774380" cy="6530731"/>
+            <a:off x="570451" y="1145229"/>
+            <a:ext cx="8263156" cy="6334806"/>
           </a:xfrm>
         </p:spPr>
       </p:pic>
@@ -8039,19 +8717,20 @@
   <p:clrMapOvr>
     <a:masterClrMapping/>
   </p:clrMapOvr>
-  <p:timing>
-    <p:tnLst>
-      <p:par>
-        <p:cTn id="1" dur="indefinite" restart="never" nodeType="tmRoot"/>
-      </p:par>
-    </p:tnLst>
-  </p:timing>
 </p:sld>
 </file>
 
-<file path=ppt/slides/slide7.xml><?xml version="1.0" encoding="utf-8"?>
+<file path=ppt/slides/slide8.xml><?xml version="1.0" encoding="utf-8"?>
 <p:sld xmlns:a="http://schemas.openxmlformats.org/drawingml/2006/main" xmlns:r="http://schemas.openxmlformats.org/officeDocument/2006/relationships" xmlns:p="http://schemas.openxmlformats.org/presentationml/2006/main">
   <p:cSld>
+    <p:bg>
+      <p:bgPr>
+        <a:solidFill>
+          <a:schemeClr val="bg1"/>
+        </a:solidFill>
+        <a:effectLst/>
+      </p:bgPr>
+    </p:bg>
     <p:spTree>
       <p:nvGrpSpPr>
         <p:cNvPr id="1" name=""/>
@@ -8082,8 +8761,8 @@
           <a:lstStyle/>
           <a:p>
             <a:r>
-              <a:rPr lang="it-IT" dirty="0" smtClean="0"/>
-              <a:t>...an algorithm</a:t>
+              <a:rPr lang="it-IT" dirty="0" err="1"/>
+              <a:t>interfaces</a:t>
             </a:r>
             <a:endParaRPr lang="it-IT" dirty="0"/>
           </a:p>
@@ -8104,7 +8783,25 @@
           <a:bodyPr/>
           <a:lstStyle/>
           <a:p>
-            <a:endParaRPr lang="it-IT"/>
+            <a:r>
+              <a:rPr lang="it-IT" dirty="0" err="1"/>
+              <a:t>WSInterface</a:t>
+            </a:r>
+            <a:endParaRPr lang="it-IT" dirty="0"/>
+          </a:p>
+          <a:p>
+            <a:r>
+              <a:rPr lang="it-IT" dirty="0" err="1"/>
+              <a:t>ManageInformation</a:t>
+            </a:r>
+            <a:endParaRPr lang="it-IT" dirty="0"/>
+          </a:p>
+          <a:p>
+            <a:r>
+              <a:rPr lang="it-IT" dirty="0" err="1"/>
+              <a:t>DataInterface</a:t>
+            </a:r>
+            <a:endParaRPr lang="it-IT" dirty="0"/>
           </a:p>
         </p:txBody>
       </p:sp>
@@ -8118,19 +8815,20 @@
   <p:clrMapOvr>
     <a:masterClrMapping/>
   </p:clrMapOvr>
-  <p:timing>
-    <p:tnLst>
-      <p:par>
-        <p:cTn id="1" dur="indefinite" restart="never" nodeType="tmRoot"/>
-      </p:par>
-    </p:tnLst>
-  </p:timing>
 </p:sld>
 </file>
 
-<file path=ppt/slides/slide8.xml><?xml version="1.0" encoding="utf-8"?>
+<file path=ppt/slides/slide9.xml><?xml version="1.0" encoding="utf-8"?>
 <p:sld xmlns:a="http://schemas.openxmlformats.org/drawingml/2006/main" xmlns:r="http://schemas.openxmlformats.org/officeDocument/2006/relationships" xmlns:p="http://schemas.openxmlformats.org/presentationml/2006/main">
   <p:cSld>
+    <p:bg>
+      <p:bgPr>
+        <a:solidFill>
+          <a:schemeClr val="bg1"/>
+        </a:solidFill>
+        <a:effectLst/>
+      </p:bgPr>
+    </p:bg>
     <p:spTree>
       <p:nvGrpSpPr>
         <p:cNvPr id="1" name=""/>
@@ -8155,20 +8853,33 @@
             <p:ph type="title"/>
           </p:nvPr>
         </p:nvSpPr>
-        <p:spPr>
-          <a:xfrm>
-            <a:off x="2850685" y="2733700"/>
-            <a:ext cx="3740120" cy="1492132"/>
-          </a:xfrm>
-        </p:spPr>
+        <p:spPr/>
         <p:txBody>
           <a:bodyPr/>
           <a:lstStyle/>
           <a:p>
             <a:r>
-              <a:rPr lang="it-IT" dirty="0" smtClean="0"/>
-              <a:t>Questions?</a:t>
-            </a:r>
+              <a:rPr lang="it-IT" dirty="0"/>
+              <a:t>ARCHITECTURAL STYLES AND PATTERNS</a:t>
+            </a:r>
+          </a:p>
+        </p:txBody>
+      </p:sp>
+      <p:sp>
+        <p:nvSpPr>
+          <p:cNvPr id="3" name="Content Placeholder 2"/>
+          <p:cNvSpPr>
+            <a:spLocks noGrp="1"/>
+          </p:cNvSpPr>
+          <p:nvPr>
+            <p:ph idx="1"/>
+          </p:nvPr>
+        </p:nvSpPr>
+        <p:spPr/>
+        <p:txBody>
+          <a:bodyPr/>
+          <a:lstStyle/>
+          <a:p>
             <a:endParaRPr lang="it-IT" dirty="0"/>
           </a:p>
         </p:txBody>
@@ -8176,7 +8887,7 @@
     </p:spTree>
     <p:extLst>
       <p:ext uri="{BB962C8B-B14F-4D97-AF65-F5344CB8AC3E}">
-        <p14:creationId xmlns:p14="http://schemas.microsoft.com/office/powerpoint/2010/main" val="710917353"/>
+        <p14:creationId xmlns:p14="http://schemas.microsoft.com/office/powerpoint/2010/main" val="3442792181"/>
       </p:ext>
     </p:extLst>
   </p:cSld>

</xml_diff>